<commit_message>
Source Codes and Files
</commit_message>
<xml_diff>
--- a/ConsDelay.pptx
+++ b/ConsDelay.pptx
@@ -7453,337 +7453,6 @@
       </p:grpSpPr>
       <p:sp>
         <p:nvSpPr>
-          <p:cNvPr id="4" name="Title 1">
-            <a:extLst>
-              <a:ext uri="{FF2B5EF4-FFF2-40B4-BE49-F238E27FC236}">
-                <a16:creationId xmlns:a16="http://schemas.microsoft.com/office/drawing/2014/main" id="{514A2664-2BC6-2C8F-2E41-5DDEB57BB843}"/>
-              </a:ext>
-            </a:extLst>
-          </p:cNvPr>
-          <p:cNvSpPr txBox="1">
-            <a:spLocks/>
-          </p:cNvSpPr>
-          <p:nvPr/>
-        </p:nvSpPr>
-        <p:spPr>
-          <a:xfrm>
-            <a:off x="-80396" y="1274027"/>
-            <a:ext cx="9305925" cy="1350228"/>
-          </a:xfrm>
-          <a:prstGeom prst="rect">
-            <a:avLst/>
-          </a:prstGeom>
-          <a:noFill/>
-          <a:ln>
-            <a:noFill/>
-          </a:ln>
-        </p:spPr>
-        <p:txBody>
-          <a:bodyPr spcFirstLastPara="1" wrap="square" lIns="91425" tIns="91425" rIns="91425" bIns="91425" anchor="ctr" anchorCtr="0">
-            <a:normAutofit lnSpcReduction="10000"/>
-          </a:bodyPr>
-          <a:lstStyle>
-            <a:defPPr marR="0" lvl="0" algn="l" rtl="0">
-              <a:lnSpc>
-                <a:spcPct val="100000"/>
-              </a:lnSpc>
-              <a:spcBef>
-                <a:spcPts val="0"/>
-              </a:spcBef>
-              <a:spcAft>
-                <a:spcPts val="0"/>
-              </a:spcAft>
-            </a:defPPr>
-            <a:lvl1pPr marR="0" lvl="0" algn="l" rtl="0">
-              <a:lnSpc>
-                <a:spcPct val="100000"/>
-              </a:lnSpc>
-              <a:spcBef>
-                <a:spcPts val="0"/>
-              </a:spcBef>
-              <a:spcAft>
-                <a:spcPts val="0"/>
-              </a:spcAft>
-              <a:buClr>
-                <a:schemeClr val="dk1"/>
-              </a:buClr>
-              <a:buSzPts val="2800"/>
-              <a:buFont typeface="Alata"/>
-              <a:buNone/>
-              <a:defRPr sz="2800" b="0" i="0" u="none" strike="noStrike" cap="none">
-                <a:solidFill>
-                  <a:schemeClr val="dk1"/>
-                </a:solidFill>
-                <a:latin typeface="Alata"/>
-                <a:ea typeface="Alata"/>
-                <a:cs typeface="Alata"/>
-                <a:sym typeface="Alata"/>
-              </a:defRPr>
-            </a:lvl1pPr>
-            <a:lvl2pPr marR="0" lvl="1" algn="l" rtl="0">
-              <a:lnSpc>
-                <a:spcPct val="100000"/>
-              </a:lnSpc>
-              <a:spcBef>
-                <a:spcPts val="0"/>
-              </a:spcBef>
-              <a:spcAft>
-                <a:spcPts val="0"/>
-              </a:spcAft>
-              <a:buClr>
-                <a:schemeClr val="dk1"/>
-              </a:buClr>
-              <a:buSzPts val="2800"/>
-              <a:buFont typeface="Arial"/>
-              <a:buNone/>
-              <a:defRPr sz="2800" b="0" i="0" u="none" strike="noStrike" cap="none">
-                <a:solidFill>
-                  <a:schemeClr val="dk1"/>
-                </a:solidFill>
-                <a:latin typeface="Arial"/>
-                <a:ea typeface="Arial"/>
-                <a:cs typeface="Arial"/>
-                <a:sym typeface="Arial"/>
-              </a:defRPr>
-            </a:lvl2pPr>
-            <a:lvl3pPr marR="0" lvl="2" algn="l" rtl="0">
-              <a:lnSpc>
-                <a:spcPct val="100000"/>
-              </a:lnSpc>
-              <a:spcBef>
-                <a:spcPts val="0"/>
-              </a:spcBef>
-              <a:spcAft>
-                <a:spcPts val="0"/>
-              </a:spcAft>
-              <a:buClr>
-                <a:schemeClr val="dk1"/>
-              </a:buClr>
-              <a:buSzPts val="2800"/>
-              <a:buFont typeface="Arial"/>
-              <a:buNone/>
-              <a:defRPr sz="2800" b="0" i="0" u="none" strike="noStrike" cap="none">
-                <a:solidFill>
-                  <a:schemeClr val="dk1"/>
-                </a:solidFill>
-                <a:latin typeface="Arial"/>
-                <a:ea typeface="Arial"/>
-                <a:cs typeface="Arial"/>
-                <a:sym typeface="Arial"/>
-              </a:defRPr>
-            </a:lvl3pPr>
-            <a:lvl4pPr marR="0" lvl="3" algn="l" rtl="0">
-              <a:lnSpc>
-                <a:spcPct val="100000"/>
-              </a:lnSpc>
-              <a:spcBef>
-                <a:spcPts val="0"/>
-              </a:spcBef>
-              <a:spcAft>
-                <a:spcPts val="0"/>
-              </a:spcAft>
-              <a:buClr>
-                <a:schemeClr val="dk1"/>
-              </a:buClr>
-              <a:buSzPts val="2800"/>
-              <a:buFont typeface="Arial"/>
-              <a:buNone/>
-              <a:defRPr sz="2800" b="0" i="0" u="none" strike="noStrike" cap="none">
-                <a:solidFill>
-                  <a:schemeClr val="dk1"/>
-                </a:solidFill>
-                <a:latin typeface="Arial"/>
-                <a:ea typeface="Arial"/>
-                <a:cs typeface="Arial"/>
-                <a:sym typeface="Arial"/>
-              </a:defRPr>
-            </a:lvl4pPr>
-            <a:lvl5pPr marR="0" lvl="4" algn="l" rtl="0">
-              <a:lnSpc>
-                <a:spcPct val="100000"/>
-              </a:lnSpc>
-              <a:spcBef>
-                <a:spcPts val="0"/>
-              </a:spcBef>
-              <a:spcAft>
-                <a:spcPts val="0"/>
-              </a:spcAft>
-              <a:buClr>
-                <a:schemeClr val="dk1"/>
-              </a:buClr>
-              <a:buSzPts val="2800"/>
-              <a:buFont typeface="Arial"/>
-              <a:buNone/>
-              <a:defRPr sz="2800" b="0" i="0" u="none" strike="noStrike" cap="none">
-                <a:solidFill>
-                  <a:schemeClr val="dk1"/>
-                </a:solidFill>
-                <a:latin typeface="Arial"/>
-                <a:ea typeface="Arial"/>
-                <a:cs typeface="Arial"/>
-                <a:sym typeface="Arial"/>
-              </a:defRPr>
-            </a:lvl5pPr>
-            <a:lvl6pPr marR="0" lvl="5" algn="l" rtl="0">
-              <a:lnSpc>
-                <a:spcPct val="100000"/>
-              </a:lnSpc>
-              <a:spcBef>
-                <a:spcPts val="0"/>
-              </a:spcBef>
-              <a:spcAft>
-                <a:spcPts val="0"/>
-              </a:spcAft>
-              <a:buClr>
-                <a:schemeClr val="dk1"/>
-              </a:buClr>
-              <a:buSzPts val="2800"/>
-              <a:buFont typeface="Arial"/>
-              <a:buNone/>
-              <a:defRPr sz="2800" b="0" i="0" u="none" strike="noStrike" cap="none">
-                <a:solidFill>
-                  <a:schemeClr val="dk1"/>
-                </a:solidFill>
-                <a:latin typeface="Arial"/>
-                <a:ea typeface="Arial"/>
-                <a:cs typeface="Arial"/>
-                <a:sym typeface="Arial"/>
-              </a:defRPr>
-            </a:lvl6pPr>
-            <a:lvl7pPr marR="0" lvl="6" algn="l" rtl="0">
-              <a:lnSpc>
-                <a:spcPct val="100000"/>
-              </a:lnSpc>
-              <a:spcBef>
-                <a:spcPts val="0"/>
-              </a:spcBef>
-              <a:spcAft>
-                <a:spcPts val="0"/>
-              </a:spcAft>
-              <a:buClr>
-                <a:schemeClr val="dk1"/>
-              </a:buClr>
-              <a:buSzPts val="2800"/>
-              <a:buFont typeface="Arial"/>
-              <a:buNone/>
-              <a:defRPr sz="2800" b="0" i="0" u="none" strike="noStrike" cap="none">
-                <a:solidFill>
-                  <a:schemeClr val="dk1"/>
-                </a:solidFill>
-                <a:latin typeface="Arial"/>
-                <a:ea typeface="Arial"/>
-                <a:cs typeface="Arial"/>
-                <a:sym typeface="Arial"/>
-              </a:defRPr>
-            </a:lvl7pPr>
-            <a:lvl8pPr marR="0" lvl="7" algn="l" rtl="0">
-              <a:lnSpc>
-                <a:spcPct val="100000"/>
-              </a:lnSpc>
-              <a:spcBef>
-                <a:spcPts val="0"/>
-              </a:spcBef>
-              <a:spcAft>
-                <a:spcPts val="0"/>
-              </a:spcAft>
-              <a:buClr>
-                <a:schemeClr val="dk1"/>
-              </a:buClr>
-              <a:buSzPts val="2800"/>
-              <a:buFont typeface="Arial"/>
-              <a:buNone/>
-              <a:defRPr sz="2800" b="0" i="0" u="none" strike="noStrike" cap="none">
-                <a:solidFill>
-                  <a:schemeClr val="dk1"/>
-                </a:solidFill>
-                <a:latin typeface="Arial"/>
-                <a:ea typeface="Arial"/>
-                <a:cs typeface="Arial"/>
-                <a:sym typeface="Arial"/>
-              </a:defRPr>
-            </a:lvl8pPr>
-            <a:lvl9pPr marR="0" lvl="8" algn="l" rtl="0">
-              <a:lnSpc>
-                <a:spcPct val="100000"/>
-              </a:lnSpc>
-              <a:spcBef>
-                <a:spcPts val="0"/>
-              </a:spcBef>
-              <a:spcAft>
-                <a:spcPts val="0"/>
-              </a:spcAft>
-              <a:buClr>
-                <a:schemeClr val="dk1"/>
-              </a:buClr>
-              <a:buSzPts val="2800"/>
-              <a:buFont typeface="Arial"/>
-              <a:buNone/>
-              <a:defRPr sz="2800" b="0" i="0" u="none" strike="noStrike" cap="none">
-                <a:solidFill>
-                  <a:schemeClr val="dk1"/>
-                </a:solidFill>
-                <a:latin typeface="Arial"/>
-                <a:ea typeface="Arial"/>
-                <a:cs typeface="Arial"/>
-                <a:sym typeface="Arial"/>
-              </a:defRPr>
-            </a:lvl9pPr>
-          </a:lstStyle>
-          <a:p>
-            <a:pPr algn="ctr"/>
-            <a:r>
-              <a:rPr lang="en-US" dirty="0">
-                <a:solidFill>
-                  <a:srgbClr val="000000"/>
-                </a:solidFill>
-                <a:latin typeface="Times New Roman" panose="02020603050405020304" pitchFamily="18" charset="0"/>
-                <a:cs typeface="Times New Roman" panose="02020603050405020304" pitchFamily="18" charset="0"/>
-              </a:rPr>
-              <a:t>Khulna University of Engineering &amp; Technology</a:t>
-            </a:r>
-            <a:br>
-              <a:rPr lang="en-US" dirty="0">
-                <a:solidFill>
-                  <a:srgbClr val="000000"/>
-                </a:solidFill>
-                <a:latin typeface="Times New Roman" panose="02020603050405020304" pitchFamily="18" charset="0"/>
-                <a:cs typeface="Times New Roman" panose="02020603050405020304" pitchFamily="18" charset="0"/>
-              </a:rPr>
-            </a:br>
-            <a:r>
-              <a:rPr lang="en-US" dirty="0">
-                <a:solidFill>
-                  <a:srgbClr val="000000"/>
-                </a:solidFill>
-                <a:latin typeface="Times New Roman" panose="02020603050405020304" pitchFamily="18" charset="0"/>
-                <a:cs typeface="Times New Roman" panose="02020603050405020304" pitchFamily="18" charset="0"/>
-              </a:rPr>
-              <a:t>BECM 4000</a:t>
-            </a:r>
-            <a:br>
-              <a:rPr lang="en-US" dirty="0">
-                <a:solidFill>
-                  <a:srgbClr val="000000"/>
-                </a:solidFill>
-                <a:latin typeface="Times New Roman" panose="02020603050405020304" pitchFamily="18" charset="0"/>
-                <a:cs typeface="Times New Roman" panose="02020603050405020304" pitchFamily="18" charset="0"/>
-              </a:rPr>
-            </a:br>
-            <a:r>
-              <a:rPr lang="en-US" dirty="0">
-                <a:solidFill>
-                  <a:srgbClr val="000000"/>
-                </a:solidFill>
-                <a:latin typeface="Times New Roman" panose="02020603050405020304" pitchFamily="18" charset="0"/>
-                <a:cs typeface="Times New Roman" panose="02020603050405020304" pitchFamily="18" charset="0"/>
-              </a:rPr>
-              <a:t>Project and Thesis</a:t>
-            </a:r>
-          </a:p>
-        </p:txBody>
-      </p:sp>
-      <p:sp>
-        <p:nvSpPr>
           <p:cNvPr id="5" name="Subtitle 2">
             <a:extLst>
               <a:ext uri="{FF2B5EF4-FFF2-40B4-BE49-F238E27FC236}">
@@ -7798,7 +7467,7 @@
         </p:nvSpPr>
         <p:spPr>
           <a:xfrm>
-            <a:off x="256478" y="2463711"/>
+            <a:off x="256478" y="2083064"/>
             <a:ext cx="8631044" cy="977372"/>
           </a:xfrm>
           <a:prstGeom prst="rect">
@@ -8152,714 +7821,6 @@
           </a:p>
         </p:txBody>
       </p:sp>
-      <p:sp>
-        <p:nvSpPr>
-          <p:cNvPr id="12" name="Subtitle 2">
-            <a:extLst>
-              <a:ext uri="{FF2B5EF4-FFF2-40B4-BE49-F238E27FC236}">
-                <a16:creationId xmlns:a16="http://schemas.microsoft.com/office/drawing/2014/main" id="{0F3835AC-D5EE-9D41-A878-B91B055C0F4B}"/>
-              </a:ext>
-            </a:extLst>
-          </p:cNvPr>
-          <p:cNvSpPr txBox="1">
-            <a:spLocks/>
-          </p:cNvSpPr>
-          <p:nvPr/>
-        </p:nvSpPr>
-        <p:spPr>
-          <a:xfrm>
-            <a:off x="5619299" y="3477956"/>
-            <a:ext cx="3268225" cy="1414719"/>
-          </a:xfrm>
-          <a:prstGeom prst="rect">
-            <a:avLst/>
-          </a:prstGeom>
-        </p:spPr>
-        <p:txBody>
-          <a:bodyPr vert="horz" lIns="91440" tIns="45720" rIns="91440" bIns="45720" rtlCol="0" anchor="ctr">
-            <a:noAutofit/>
-          </a:bodyPr>
-          <a:lstStyle>
-            <a:lvl1pPr marL="0" indent="0" algn="l" defTabSz="457200" rtl="0" eaLnBrk="1" latinLnBrk="0" hangingPunct="1">
-              <a:spcBef>
-                <a:spcPct val="20000"/>
-              </a:spcBef>
-              <a:spcAft>
-                <a:spcPts val="600"/>
-              </a:spcAft>
-              <a:buClr>
-                <a:schemeClr val="tx1"/>
-              </a:buClr>
-              <a:buSzPct val="80000"/>
-              <a:buFont typeface="Wingdings 3" panose="05040102010807070707" pitchFamily="18" charset="2"/>
-              <a:buNone/>
-              <a:defRPr sz="2100" kern="1200" cap="none">
-                <a:solidFill>
-                  <a:schemeClr val="bg2">
-                    <a:lumMod val="75000"/>
-                  </a:schemeClr>
-                </a:solidFill>
-                <a:effectLst/>
-                <a:latin typeface="+mn-lt"/>
-                <a:ea typeface="+mn-ea"/>
-                <a:cs typeface="+mn-cs"/>
-              </a:defRPr>
-            </a:lvl1pPr>
-            <a:lvl2pPr marL="457200" indent="0" algn="ctr" defTabSz="457200" rtl="0" eaLnBrk="1" latinLnBrk="0" hangingPunct="1">
-              <a:spcBef>
-                <a:spcPct val="20000"/>
-              </a:spcBef>
-              <a:spcAft>
-                <a:spcPts val="600"/>
-              </a:spcAft>
-              <a:buClr>
-                <a:schemeClr val="tx1"/>
-              </a:buClr>
-              <a:buSzPct val="80000"/>
-              <a:buFont typeface="Wingdings 3" panose="05040102010807070707" pitchFamily="18" charset="2"/>
-              <a:buNone/>
-              <a:defRPr sz="1800" kern="1200" cap="none">
-                <a:solidFill>
-                  <a:schemeClr val="tx1">
-                    <a:tint val="75000"/>
-                  </a:schemeClr>
-                </a:solidFill>
-                <a:effectLst/>
-                <a:latin typeface="+mn-lt"/>
-                <a:ea typeface="+mn-ea"/>
-                <a:cs typeface="+mn-cs"/>
-              </a:defRPr>
-            </a:lvl2pPr>
-            <a:lvl3pPr marL="914400" indent="0" algn="ctr" defTabSz="457200" rtl="0" eaLnBrk="1" latinLnBrk="0" hangingPunct="1">
-              <a:spcBef>
-                <a:spcPct val="20000"/>
-              </a:spcBef>
-              <a:spcAft>
-                <a:spcPts val="600"/>
-              </a:spcAft>
-              <a:buClr>
-                <a:schemeClr val="tx1"/>
-              </a:buClr>
-              <a:buSzPct val="80000"/>
-              <a:buFont typeface="Wingdings 3" panose="05040102010807070707" pitchFamily="18" charset="2"/>
-              <a:buNone/>
-              <a:defRPr sz="1600" kern="1200" cap="none">
-                <a:solidFill>
-                  <a:schemeClr val="tx1">
-                    <a:tint val="75000"/>
-                  </a:schemeClr>
-                </a:solidFill>
-                <a:effectLst/>
-                <a:latin typeface="+mn-lt"/>
-                <a:ea typeface="+mn-ea"/>
-                <a:cs typeface="+mn-cs"/>
-              </a:defRPr>
-            </a:lvl3pPr>
-            <a:lvl4pPr marL="1371600" indent="0" algn="ctr" defTabSz="457200" rtl="0" eaLnBrk="1" latinLnBrk="0" hangingPunct="1">
-              <a:spcBef>
-                <a:spcPct val="20000"/>
-              </a:spcBef>
-              <a:spcAft>
-                <a:spcPts val="600"/>
-              </a:spcAft>
-              <a:buClr>
-                <a:schemeClr val="tx1"/>
-              </a:buClr>
-              <a:buSzPct val="80000"/>
-              <a:buFont typeface="Wingdings 3" panose="05040102010807070707" pitchFamily="18" charset="2"/>
-              <a:buNone/>
-              <a:defRPr sz="1400" kern="1200" cap="none">
-                <a:solidFill>
-                  <a:schemeClr val="tx1">
-                    <a:tint val="75000"/>
-                  </a:schemeClr>
-                </a:solidFill>
-                <a:effectLst/>
-                <a:latin typeface="+mn-lt"/>
-                <a:ea typeface="+mn-ea"/>
-                <a:cs typeface="+mn-cs"/>
-              </a:defRPr>
-            </a:lvl4pPr>
-            <a:lvl5pPr marL="1828800" indent="0" algn="ctr" defTabSz="457200" rtl="0" eaLnBrk="1" latinLnBrk="0" hangingPunct="1">
-              <a:spcBef>
-                <a:spcPct val="20000"/>
-              </a:spcBef>
-              <a:spcAft>
-                <a:spcPts val="600"/>
-              </a:spcAft>
-              <a:buClr>
-                <a:schemeClr val="tx1"/>
-              </a:buClr>
-              <a:buSzPct val="80000"/>
-              <a:buFont typeface="Wingdings 3" panose="05040102010807070707" pitchFamily="18" charset="2"/>
-              <a:buNone/>
-              <a:defRPr sz="1400" kern="1200" cap="none">
-                <a:solidFill>
-                  <a:schemeClr val="tx1">
-                    <a:tint val="75000"/>
-                  </a:schemeClr>
-                </a:solidFill>
-                <a:effectLst/>
-                <a:latin typeface="+mn-lt"/>
-                <a:ea typeface="+mn-ea"/>
-                <a:cs typeface="+mn-cs"/>
-              </a:defRPr>
-            </a:lvl5pPr>
-            <a:lvl6pPr marL="2286000" indent="0" algn="ctr" defTabSz="457200" rtl="0" eaLnBrk="1" latinLnBrk="0" hangingPunct="1">
-              <a:spcBef>
-                <a:spcPct val="20000"/>
-              </a:spcBef>
-              <a:spcAft>
-                <a:spcPts val="600"/>
-              </a:spcAft>
-              <a:buClr>
-                <a:schemeClr val="tx1"/>
-              </a:buClr>
-              <a:buSzPct val="80000"/>
-              <a:buFont typeface="Wingdings 3" panose="05040102010807070707" pitchFamily="18" charset="2"/>
-              <a:buNone/>
-              <a:defRPr sz="1400" kern="1200" cap="none">
-                <a:solidFill>
-                  <a:schemeClr val="tx1">
-                    <a:tint val="75000"/>
-                  </a:schemeClr>
-                </a:solidFill>
-                <a:effectLst/>
-                <a:latin typeface="+mn-lt"/>
-                <a:ea typeface="+mn-ea"/>
-                <a:cs typeface="+mn-cs"/>
-              </a:defRPr>
-            </a:lvl6pPr>
-            <a:lvl7pPr marL="2743200" indent="0" algn="ctr" defTabSz="457200" rtl="0" eaLnBrk="1" latinLnBrk="0" hangingPunct="1">
-              <a:spcBef>
-                <a:spcPct val="20000"/>
-              </a:spcBef>
-              <a:spcAft>
-                <a:spcPts val="600"/>
-              </a:spcAft>
-              <a:buClr>
-                <a:schemeClr val="tx1"/>
-              </a:buClr>
-              <a:buSzPct val="80000"/>
-              <a:buFont typeface="Wingdings 3" panose="05040102010807070707" pitchFamily="18" charset="2"/>
-              <a:buNone/>
-              <a:defRPr sz="1400" kern="1200" cap="none">
-                <a:solidFill>
-                  <a:schemeClr val="tx1">
-                    <a:tint val="75000"/>
-                  </a:schemeClr>
-                </a:solidFill>
-                <a:effectLst/>
-                <a:latin typeface="+mn-lt"/>
-                <a:ea typeface="+mn-ea"/>
-                <a:cs typeface="+mn-cs"/>
-              </a:defRPr>
-            </a:lvl7pPr>
-            <a:lvl8pPr marL="3200400" indent="0" algn="ctr" defTabSz="457200" rtl="0" eaLnBrk="1" latinLnBrk="0" hangingPunct="1">
-              <a:spcBef>
-                <a:spcPct val="20000"/>
-              </a:spcBef>
-              <a:spcAft>
-                <a:spcPts val="600"/>
-              </a:spcAft>
-              <a:buClr>
-                <a:schemeClr val="tx1"/>
-              </a:buClr>
-              <a:buSzPct val="80000"/>
-              <a:buFont typeface="Wingdings 3" panose="05040102010807070707" pitchFamily="18" charset="2"/>
-              <a:buNone/>
-              <a:defRPr sz="1400" kern="1200" cap="none">
-                <a:solidFill>
-                  <a:schemeClr val="tx1">
-                    <a:tint val="75000"/>
-                  </a:schemeClr>
-                </a:solidFill>
-                <a:effectLst/>
-                <a:latin typeface="+mn-lt"/>
-                <a:ea typeface="+mn-ea"/>
-                <a:cs typeface="+mn-cs"/>
-              </a:defRPr>
-            </a:lvl8pPr>
-            <a:lvl9pPr marL="3657600" indent="0" algn="ctr" defTabSz="457200" rtl="0" eaLnBrk="1" latinLnBrk="0" hangingPunct="1">
-              <a:spcBef>
-                <a:spcPct val="20000"/>
-              </a:spcBef>
-              <a:spcAft>
-                <a:spcPts val="600"/>
-              </a:spcAft>
-              <a:buClr>
-                <a:schemeClr val="tx1"/>
-              </a:buClr>
-              <a:buSzPct val="80000"/>
-              <a:buFont typeface="Wingdings 3" panose="05040102010807070707" pitchFamily="18" charset="2"/>
-              <a:buNone/>
-              <a:defRPr sz="1400" kern="1200" cap="none">
-                <a:solidFill>
-                  <a:schemeClr val="tx1">
-                    <a:tint val="75000"/>
-                  </a:schemeClr>
-                </a:solidFill>
-                <a:effectLst/>
-                <a:latin typeface="+mn-lt"/>
-                <a:ea typeface="+mn-ea"/>
-                <a:cs typeface="+mn-cs"/>
-              </a:defRPr>
-            </a:lvl9pPr>
-          </a:lstStyle>
-          <a:p>
-            <a:pPr algn="r">
-              <a:spcBef>
-                <a:spcPts val="200"/>
-              </a:spcBef>
-              <a:spcAft>
-                <a:spcPts val="200"/>
-              </a:spcAft>
-            </a:pPr>
-            <a:r>
-              <a:rPr lang="en-US" sz="1800" b="1" dirty="0">
-                <a:solidFill>
-                  <a:srgbClr val="000000"/>
-                </a:solidFill>
-                <a:latin typeface="Times New Roman" panose="02020603050405020304" pitchFamily="18" charset="0"/>
-                <a:cs typeface="Times New Roman" panose="02020603050405020304" pitchFamily="18" charset="0"/>
-              </a:rPr>
-              <a:t>Presented By:</a:t>
-            </a:r>
-          </a:p>
-          <a:p>
-            <a:pPr algn="r">
-              <a:spcBef>
-                <a:spcPts val="200"/>
-              </a:spcBef>
-              <a:spcAft>
-                <a:spcPts val="200"/>
-              </a:spcAft>
-            </a:pPr>
-            <a:r>
-              <a:rPr lang="en-US" sz="1800" b="1" dirty="0">
-                <a:solidFill>
-                  <a:srgbClr val="000000"/>
-                </a:solidFill>
-                <a:latin typeface="Times New Roman" panose="02020603050405020304" pitchFamily="18" charset="0"/>
-                <a:cs typeface="Times New Roman" panose="02020603050405020304" pitchFamily="18" charset="0"/>
-              </a:rPr>
-              <a:t>Sayed Arafat</a:t>
-            </a:r>
-          </a:p>
-          <a:p>
-            <a:pPr algn="r">
-              <a:spcBef>
-                <a:spcPts val="200"/>
-              </a:spcBef>
-              <a:spcAft>
-                <a:spcPts val="200"/>
-              </a:spcAft>
-            </a:pPr>
-            <a:r>
-              <a:rPr lang="en-US" sz="1800" dirty="0">
-                <a:solidFill>
-                  <a:srgbClr val="000000"/>
-                </a:solidFill>
-                <a:latin typeface="Times New Roman" panose="02020603050405020304" pitchFamily="18" charset="0"/>
-                <a:cs typeface="Times New Roman" panose="02020603050405020304" pitchFamily="18" charset="0"/>
-              </a:rPr>
-              <a:t>Roll: 1823027</a:t>
-            </a:r>
-          </a:p>
-          <a:p>
-            <a:pPr algn="r">
-              <a:spcBef>
-                <a:spcPts val="200"/>
-              </a:spcBef>
-              <a:spcAft>
-                <a:spcPts val="200"/>
-              </a:spcAft>
-            </a:pPr>
-            <a:r>
-              <a:rPr lang="en-US" sz="1800" dirty="0">
-                <a:solidFill>
-                  <a:srgbClr val="000000"/>
-                </a:solidFill>
-                <a:latin typeface="Times New Roman" panose="02020603050405020304" pitchFamily="18" charset="0"/>
-                <a:cs typeface="Times New Roman" panose="02020603050405020304" pitchFamily="18" charset="0"/>
-              </a:rPr>
-              <a:t>Department of BECM, KUET</a:t>
-            </a:r>
-          </a:p>
-        </p:txBody>
-      </p:sp>
-      <p:sp>
-        <p:nvSpPr>
-          <p:cNvPr id="13" name="Subtitle 2">
-            <a:extLst>
-              <a:ext uri="{FF2B5EF4-FFF2-40B4-BE49-F238E27FC236}">
-                <a16:creationId xmlns:a16="http://schemas.microsoft.com/office/drawing/2014/main" id="{B3A08D24-BB41-3D6A-9AD5-6D466834A9AA}"/>
-              </a:ext>
-            </a:extLst>
-          </p:cNvPr>
-          <p:cNvSpPr txBox="1">
-            <a:spLocks/>
-          </p:cNvSpPr>
-          <p:nvPr/>
-        </p:nvSpPr>
-        <p:spPr>
-          <a:xfrm>
-            <a:off x="256478" y="3477955"/>
-            <a:ext cx="3268225" cy="1414720"/>
-          </a:xfrm>
-          <a:prstGeom prst="rect">
-            <a:avLst/>
-          </a:prstGeom>
-        </p:spPr>
-        <p:txBody>
-          <a:bodyPr vert="horz" lIns="91440" tIns="45720" rIns="91440" bIns="45720" rtlCol="0" anchor="ctr">
-            <a:normAutofit/>
-          </a:bodyPr>
-          <a:lstStyle>
-            <a:lvl1pPr marL="0" indent="0" algn="l" defTabSz="457200" rtl="0" eaLnBrk="1" latinLnBrk="0" hangingPunct="1">
-              <a:spcBef>
-                <a:spcPct val="20000"/>
-              </a:spcBef>
-              <a:spcAft>
-                <a:spcPts val="600"/>
-              </a:spcAft>
-              <a:buClr>
-                <a:schemeClr val="tx1"/>
-              </a:buClr>
-              <a:buSzPct val="80000"/>
-              <a:buFont typeface="Wingdings 3" panose="05040102010807070707" pitchFamily="18" charset="2"/>
-              <a:buNone/>
-              <a:defRPr sz="2100" kern="1200" cap="none">
-                <a:solidFill>
-                  <a:schemeClr val="bg2">
-                    <a:lumMod val="75000"/>
-                  </a:schemeClr>
-                </a:solidFill>
-                <a:effectLst/>
-                <a:latin typeface="+mn-lt"/>
-                <a:ea typeface="+mn-ea"/>
-                <a:cs typeface="+mn-cs"/>
-              </a:defRPr>
-            </a:lvl1pPr>
-            <a:lvl2pPr marL="457200" indent="0" algn="ctr" defTabSz="457200" rtl="0" eaLnBrk="1" latinLnBrk="0" hangingPunct="1">
-              <a:spcBef>
-                <a:spcPct val="20000"/>
-              </a:spcBef>
-              <a:spcAft>
-                <a:spcPts val="600"/>
-              </a:spcAft>
-              <a:buClr>
-                <a:schemeClr val="tx1"/>
-              </a:buClr>
-              <a:buSzPct val="80000"/>
-              <a:buFont typeface="Wingdings 3" panose="05040102010807070707" pitchFamily="18" charset="2"/>
-              <a:buNone/>
-              <a:defRPr sz="1800" kern="1200" cap="none">
-                <a:solidFill>
-                  <a:schemeClr val="tx1">
-                    <a:tint val="75000"/>
-                  </a:schemeClr>
-                </a:solidFill>
-                <a:effectLst/>
-                <a:latin typeface="+mn-lt"/>
-                <a:ea typeface="+mn-ea"/>
-                <a:cs typeface="+mn-cs"/>
-              </a:defRPr>
-            </a:lvl2pPr>
-            <a:lvl3pPr marL="914400" indent="0" algn="ctr" defTabSz="457200" rtl="0" eaLnBrk="1" latinLnBrk="0" hangingPunct="1">
-              <a:spcBef>
-                <a:spcPct val="20000"/>
-              </a:spcBef>
-              <a:spcAft>
-                <a:spcPts val="600"/>
-              </a:spcAft>
-              <a:buClr>
-                <a:schemeClr val="tx1"/>
-              </a:buClr>
-              <a:buSzPct val="80000"/>
-              <a:buFont typeface="Wingdings 3" panose="05040102010807070707" pitchFamily="18" charset="2"/>
-              <a:buNone/>
-              <a:defRPr sz="1600" kern="1200" cap="none">
-                <a:solidFill>
-                  <a:schemeClr val="tx1">
-                    <a:tint val="75000"/>
-                  </a:schemeClr>
-                </a:solidFill>
-                <a:effectLst/>
-                <a:latin typeface="+mn-lt"/>
-                <a:ea typeface="+mn-ea"/>
-                <a:cs typeface="+mn-cs"/>
-              </a:defRPr>
-            </a:lvl3pPr>
-            <a:lvl4pPr marL="1371600" indent="0" algn="ctr" defTabSz="457200" rtl="0" eaLnBrk="1" latinLnBrk="0" hangingPunct="1">
-              <a:spcBef>
-                <a:spcPct val="20000"/>
-              </a:spcBef>
-              <a:spcAft>
-                <a:spcPts val="600"/>
-              </a:spcAft>
-              <a:buClr>
-                <a:schemeClr val="tx1"/>
-              </a:buClr>
-              <a:buSzPct val="80000"/>
-              <a:buFont typeface="Wingdings 3" panose="05040102010807070707" pitchFamily="18" charset="2"/>
-              <a:buNone/>
-              <a:defRPr sz="1400" kern="1200" cap="none">
-                <a:solidFill>
-                  <a:schemeClr val="tx1">
-                    <a:tint val="75000"/>
-                  </a:schemeClr>
-                </a:solidFill>
-                <a:effectLst/>
-                <a:latin typeface="+mn-lt"/>
-                <a:ea typeface="+mn-ea"/>
-                <a:cs typeface="+mn-cs"/>
-              </a:defRPr>
-            </a:lvl4pPr>
-            <a:lvl5pPr marL="1828800" indent="0" algn="ctr" defTabSz="457200" rtl="0" eaLnBrk="1" latinLnBrk="0" hangingPunct="1">
-              <a:spcBef>
-                <a:spcPct val="20000"/>
-              </a:spcBef>
-              <a:spcAft>
-                <a:spcPts val="600"/>
-              </a:spcAft>
-              <a:buClr>
-                <a:schemeClr val="tx1"/>
-              </a:buClr>
-              <a:buSzPct val="80000"/>
-              <a:buFont typeface="Wingdings 3" panose="05040102010807070707" pitchFamily="18" charset="2"/>
-              <a:buNone/>
-              <a:defRPr sz="1400" kern="1200" cap="none">
-                <a:solidFill>
-                  <a:schemeClr val="tx1">
-                    <a:tint val="75000"/>
-                  </a:schemeClr>
-                </a:solidFill>
-                <a:effectLst/>
-                <a:latin typeface="+mn-lt"/>
-                <a:ea typeface="+mn-ea"/>
-                <a:cs typeface="+mn-cs"/>
-              </a:defRPr>
-            </a:lvl5pPr>
-            <a:lvl6pPr marL="2286000" indent="0" algn="ctr" defTabSz="457200" rtl="0" eaLnBrk="1" latinLnBrk="0" hangingPunct="1">
-              <a:spcBef>
-                <a:spcPct val="20000"/>
-              </a:spcBef>
-              <a:spcAft>
-                <a:spcPts val="600"/>
-              </a:spcAft>
-              <a:buClr>
-                <a:schemeClr val="tx1"/>
-              </a:buClr>
-              <a:buSzPct val="80000"/>
-              <a:buFont typeface="Wingdings 3" panose="05040102010807070707" pitchFamily="18" charset="2"/>
-              <a:buNone/>
-              <a:defRPr sz="1400" kern="1200" cap="none">
-                <a:solidFill>
-                  <a:schemeClr val="tx1">
-                    <a:tint val="75000"/>
-                  </a:schemeClr>
-                </a:solidFill>
-                <a:effectLst/>
-                <a:latin typeface="+mn-lt"/>
-                <a:ea typeface="+mn-ea"/>
-                <a:cs typeface="+mn-cs"/>
-              </a:defRPr>
-            </a:lvl6pPr>
-            <a:lvl7pPr marL="2743200" indent="0" algn="ctr" defTabSz="457200" rtl="0" eaLnBrk="1" latinLnBrk="0" hangingPunct="1">
-              <a:spcBef>
-                <a:spcPct val="20000"/>
-              </a:spcBef>
-              <a:spcAft>
-                <a:spcPts val="600"/>
-              </a:spcAft>
-              <a:buClr>
-                <a:schemeClr val="tx1"/>
-              </a:buClr>
-              <a:buSzPct val="80000"/>
-              <a:buFont typeface="Wingdings 3" panose="05040102010807070707" pitchFamily="18" charset="2"/>
-              <a:buNone/>
-              <a:defRPr sz="1400" kern="1200" cap="none">
-                <a:solidFill>
-                  <a:schemeClr val="tx1">
-                    <a:tint val="75000"/>
-                  </a:schemeClr>
-                </a:solidFill>
-                <a:effectLst/>
-                <a:latin typeface="+mn-lt"/>
-                <a:ea typeface="+mn-ea"/>
-                <a:cs typeface="+mn-cs"/>
-              </a:defRPr>
-            </a:lvl7pPr>
-            <a:lvl8pPr marL="3200400" indent="0" algn="ctr" defTabSz="457200" rtl="0" eaLnBrk="1" latinLnBrk="0" hangingPunct="1">
-              <a:spcBef>
-                <a:spcPct val="20000"/>
-              </a:spcBef>
-              <a:spcAft>
-                <a:spcPts val="600"/>
-              </a:spcAft>
-              <a:buClr>
-                <a:schemeClr val="tx1"/>
-              </a:buClr>
-              <a:buSzPct val="80000"/>
-              <a:buFont typeface="Wingdings 3" panose="05040102010807070707" pitchFamily="18" charset="2"/>
-              <a:buNone/>
-              <a:defRPr sz="1400" kern="1200" cap="none">
-                <a:solidFill>
-                  <a:schemeClr val="tx1">
-                    <a:tint val="75000"/>
-                  </a:schemeClr>
-                </a:solidFill>
-                <a:effectLst/>
-                <a:latin typeface="+mn-lt"/>
-                <a:ea typeface="+mn-ea"/>
-                <a:cs typeface="+mn-cs"/>
-              </a:defRPr>
-            </a:lvl8pPr>
-            <a:lvl9pPr marL="3657600" indent="0" algn="ctr" defTabSz="457200" rtl="0" eaLnBrk="1" latinLnBrk="0" hangingPunct="1">
-              <a:spcBef>
-                <a:spcPct val="20000"/>
-              </a:spcBef>
-              <a:spcAft>
-                <a:spcPts val="600"/>
-              </a:spcAft>
-              <a:buClr>
-                <a:schemeClr val="tx1"/>
-              </a:buClr>
-              <a:buSzPct val="80000"/>
-              <a:buFont typeface="Wingdings 3" panose="05040102010807070707" pitchFamily="18" charset="2"/>
-              <a:buNone/>
-              <a:defRPr sz="1400" kern="1200" cap="none">
-                <a:solidFill>
-                  <a:schemeClr val="tx1">
-                    <a:tint val="75000"/>
-                  </a:schemeClr>
-                </a:solidFill>
-                <a:effectLst/>
-                <a:latin typeface="+mn-lt"/>
-                <a:ea typeface="+mn-ea"/>
-                <a:cs typeface="+mn-cs"/>
-              </a:defRPr>
-            </a:lvl9pPr>
-          </a:lstStyle>
-          <a:p>
-            <a:pPr>
-              <a:spcBef>
-                <a:spcPts val="200"/>
-              </a:spcBef>
-              <a:spcAft>
-                <a:spcPts val="200"/>
-              </a:spcAft>
-            </a:pPr>
-            <a:r>
-              <a:rPr lang="en-US" sz="1800" b="1" dirty="0">
-                <a:solidFill>
-                  <a:srgbClr val="000000"/>
-                </a:solidFill>
-                <a:latin typeface="Times New Roman" panose="02020603050405020304" pitchFamily="18" charset="0"/>
-                <a:cs typeface="Times New Roman" panose="02020603050405020304" pitchFamily="18" charset="0"/>
-              </a:rPr>
-              <a:t>Supervised By:</a:t>
-            </a:r>
-          </a:p>
-          <a:p>
-            <a:pPr>
-              <a:spcBef>
-                <a:spcPts val="200"/>
-              </a:spcBef>
-              <a:spcAft>
-                <a:spcPts val="200"/>
-              </a:spcAft>
-            </a:pPr>
-            <a:r>
-              <a:rPr lang="en-US" sz="1800" b="1" dirty="0">
-                <a:solidFill>
-                  <a:srgbClr val="000000"/>
-                </a:solidFill>
-                <a:latin typeface="Times New Roman" panose="02020603050405020304" pitchFamily="18" charset="0"/>
-                <a:cs typeface="Times New Roman" panose="02020603050405020304" pitchFamily="18" charset="0"/>
-              </a:rPr>
-              <a:t>Md. Jewel Rana</a:t>
-            </a:r>
-          </a:p>
-          <a:p>
-            <a:pPr>
-              <a:spcBef>
-                <a:spcPts val="200"/>
-              </a:spcBef>
-              <a:spcAft>
-                <a:spcPts val="200"/>
-              </a:spcAft>
-            </a:pPr>
-            <a:r>
-              <a:rPr lang="en-US" sz="1800" dirty="0">
-                <a:solidFill>
-                  <a:srgbClr val="000000"/>
-                </a:solidFill>
-                <a:latin typeface="Times New Roman" panose="02020603050405020304" pitchFamily="18" charset="0"/>
-                <a:cs typeface="Times New Roman" panose="02020603050405020304" pitchFamily="18" charset="0"/>
-              </a:rPr>
-              <a:t>Assistant Professor</a:t>
-            </a:r>
-          </a:p>
-          <a:p>
-            <a:pPr>
-              <a:spcBef>
-                <a:spcPts val="200"/>
-              </a:spcBef>
-              <a:spcAft>
-                <a:spcPts val="200"/>
-              </a:spcAft>
-            </a:pPr>
-            <a:r>
-              <a:rPr lang="en-US" sz="1800" dirty="0">
-                <a:solidFill>
-                  <a:srgbClr val="000000"/>
-                </a:solidFill>
-                <a:latin typeface="Times New Roman" panose="02020603050405020304" pitchFamily="18" charset="0"/>
-                <a:cs typeface="Times New Roman" panose="02020603050405020304" pitchFamily="18" charset="0"/>
-              </a:rPr>
-              <a:t>Department of BECM, KUET</a:t>
-            </a:r>
-          </a:p>
-        </p:txBody>
-      </p:sp>
-      <p:pic>
-        <p:nvPicPr>
-          <p:cNvPr id="14" name="Picture 13">
-            <a:extLst>
-              <a:ext uri="{FF2B5EF4-FFF2-40B4-BE49-F238E27FC236}">
-                <a16:creationId xmlns:a16="http://schemas.microsoft.com/office/drawing/2014/main" id="{6E5EF012-D743-B0B8-2DCD-7C27B1A9D8A0}"/>
-              </a:ext>
-            </a:extLst>
-          </p:cNvPr>
-          <p:cNvPicPr>
-            <a:picLocks noChangeAspect="1"/>
-          </p:cNvPicPr>
-          <p:nvPr/>
-        </p:nvPicPr>
-        <p:blipFill>
-          <a:blip r:embed="rId3" cstate="print">
-            <a:extLst>
-              <a:ext uri="{28A0092B-C50C-407E-A947-70E740481C1C}">
-                <a14:useLocalDpi xmlns:a14="http://schemas.microsoft.com/office/drawing/2010/main" val="0"/>
-              </a:ext>
-            </a:extLst>
-          </a:blip>
-          <a:stretch>
-            <a:fillRect/>
-          </a:stretch>
-        </p:blipFill>
-        <p:spPr>
-          <a:xfrm>
-            <a:off x="3943432" y="0"/>
-            <a:ext cx="1257136" cy="1502005"/>
-          </a:xfrm>
-          <a:prstGeom prst="rect">
-            <a:avLst/>
-          </a:prstGeom>
-        </p:spPr>
-      </p:pic>
     </p:spTree>
   </p:cSld>
   <p:clrMapOvr>

</xml_diff>